<commit_message>
Lecture 7 and examples
</commit_message>
<xml_diff>
--- a/06-Classes-and-Objects.pptx
+++ b/06-Classes-and-Objects.pptx
@@ -218,7 +218,7 @@
           <a:p>
             <a:fld id="{1A052DDE-B79B-4585-97B6-DCDE6083B029}" type="datetimeFigureOut">
               <a:rPr lang="bg-BG" smtClean="0"/>
-              <a:t>12.5.2015 г.</a:t>
+              <a:t>13.5.2015 г.</a:t>
             </a:fld>
             <a:endParaRPr lang="bg-BG"/>
           </a:p>
@@ -667,7 +667,7 @@
           <a:p>
             <a:fld id="{3EA744D9-3FBE-48D8-BF2A-85DF203E4D20}" type="datetimeFigureOut">
               <a:rPr lang="bg-BG" smtClean="0"/>
-              <a:t>12.5.2015 г.</a:t>
+              <a:t>13.5.2015 г.</a:t>
             </a:fld>
             <a:endParaRPr lang="bg-BG"/>
           </a:p>
@@ -837,7 +837,7 @@
           <a:p>
             <a:fld id="{3EA744D9-3FBE-48D8-BF2A-85DF203E4D20}" type="datetimeFigureOut">
               <a:rPr lang="bg-BG" smtClean="0"/>
-              <a:t>12.5.2015 г.</a:t>
+              <a:t>13.5.2015 г.</a:t>
             </a:fld>
             <a:endParaRPr lang="bg-BG"/>
           </a:p>
@@ -1017,7 +1017,7 @@
           <a:p>
             <a:fld id="{3EA744D9-3FBE-48D8-BF2A-85DF203E4D20}" type="datetimeFigureOut">
               <a:rPr lang="bg-BG" smtClean="0"/>
-              <a:t>12.5.2015 г.</a:t>
+              <a:t>13.5.2015 г.</a:t>
             </a:fld>
             <a:endParaRPr lang="bg-BG"/>
           </a:p>
@@ -1187,7 +1187,7 @@
           <a:p>
             <a:fld id="{3EA744D9-3FBE-48D8-BF2A-85DF203E4D20}" type="datetimeFigureOut">
               <a:rPr lang="bg-BG" smtClean="0"/>
-              <a:t>12.5.2015 г.</a:t>
+              <a:t>13.5.2015 г.</a:t>
             </a:fld>
             <a:endParaRPr lang="bg-BG"/>
           </a:p>
@@ -1433,7 +1433,7 @@
           <a:p>
             <a:fld id="{3EA744D9-3FBE-48D8-BF2A-85DF203E4D20}" type="datetimeFigureOut">
               <a:rPr lang="bg-BG" smtClean="0"/>
-              <a:t>12.5.2015 г.</a:t>
+              <a:t>13.5.2015 г.</a:t>
             </a:fld>
             <a:endParaRPr lang="bg-BG"/>
           </a:p>
@@ -1721,7 +1721,7 @@
           <a:p>
             <a:fld id="{3EA744D9-3FBE-48D8-BF2A-85DF203E4D20}" type="datetimeFigureOut">
               <a:rPr lang="bg-BG" smtClean="0"/>
-              <a:t>12.5.2015 г.</a:t>
+              <a:t>13.5.2015 г.</a:t>
             </a:fld>
             <a:endParaRPr lang="bg-BG"/>
           </a:p>
@@ -2143,7 +2143,7 @@
           <a:p>
             <a:fld id="{3EA744D9-3FBE-48D8-BF2A-85DF203E4D20}" type="datetimeFigureOut">
               <a:rPr lang="bg-BG" smtClean="0"/>
-              <a:t>12.5.2015 г.</a:t>
+              <a:t>13.5.2015 г.</a:t>
             </a:fld>
             <a:endParaRPr lang="bg-BG"/>
           </a:p>
@@ -2261,7 +2261,7 @@
           <a:p>
             <a:fld id="{3EA744D9-3FBE-48D8-BF2A-85DF203E4D20}" type="datetimeFigureOut">
               <a:rPr lang="bg-BG" smtClean="0"/>
-              <a:t>12.5.2015 г.</a:t>
+              <a:t>13.5.2015 г.</a:t>
             </a:fld>
             <a:endParaRPr lang="bg-BG"/>
           </a:p>
@@ -2356,7 +2356,7 @@
           <a:p>
             <a:fld id="{3EA744D9-3FBE-48D8-BF2A-85DF203E4D20}" type="datetimeFigureOut">
               <a:rPr lang="bg-BG" smtClean="0"/>
-              <a:t>12.5.2015 г.</a:t>
+              <a:t>13.5.2015 г.</a:t>
             </a:fld>
             <a:endParaRPr lang="bg-BG"/>
           </a:p>
@@ -2633,7 +2633,7 @@
           <a:p>
             <a:fld id="{3EA744D9-3FBE-48D8-BF2A-85DF203E4D20}" type="datetimeFigureOut">
               <a:rPr lang="bg-BG" smtClean="0"/>
-              <a:t>12.5.2015 г.</a:t>
+              <a:t>13.5.2015 г.</a:t>
             </a:fld>
             <a:endParaRPr lang="bg-BG"/>
           </a:p>
@@ -2886,7 +2886,7 @@
           <a:p>
             <a:fld id="{3EA744D9-3FBE-48D8-BF2A-85DF203E4D20}" type="datetimeFigureOut">
               <a:rPr lang="bg-BG" smtClean="0"/>
-              <a:t>12.5.2015 г.</a:t>
+              <a:t>13.5.2015 г.</a:t>
             </a:fld>
             <a:endParaRPr lang="bg-BG"/>
           </a:p>
@@ -3108,7 +3108,7 @@
           <a:p>
             <a:fld id="{3EA744D9-3FBE-48D8-BF2A-85DF203E4D20}" type="datetimeFigureOut">
               <a:rPr lang="bg-BG" smtClean="0"/>
-              <a:t>12.5.2015 г.</a:t>
+              <a:t>13.5.2015 г.</a:t>
             </a:fld>
             <a:endParaRPr lang="bg-BG"/>
           </a:p>
@@ -5817,67 +5817,7 @@
                   </a:schemeClr>
                 </a:solidFill>
               </a:rPr>
-              <a:t>. За </a:t>
-            </a:r>
-            <a:r>
-              <a:rPr lang="ru-RU" dirty="0" err="1">
-                <a:solidFill>
-                  <a:schemeClr val="bg1">
-                    <a:lumMod val="95000"/>
-                  </a:schemeClr>
-                </a:solidFill>
-              </a:rPr>
-              <a:t>валидни</a:t>
-            </a:r>
-            <a:r>
-              <a:rPr lang="ru-RU" dirty="0">
-                <a:solidFill>
-                  <a:schemeClr val="bg1">
-                    <a:lumMod val="95000"/>
-                  </a:schemeClr>
-                </a:solidFill>
-              </a:rPr>
-              <a:t> </a:t>
-            </a:r>
-            <a:r>
-              <a:rPr lang="ru-RU" dirty="0" err="1">
-                <a:solidFill>
-                  <a:schemeClr val="bg1">
-                    <a:lumMod val="95000"/>
-                  </a:schemeClr>
-                </a:solidFill>
-              </a:rPr>
-              <a:t>данни</a:t>
-            </a:r>
-            <a:r>
-              <a:rPr lang="ru-RU" dirty="0">
-                <a:solidFill>
-                  <a:schemeClr val="bg1">
-                    <a:lumMod val="95000"/>
-                  </a:schemeClr>
-                </a:solidFill>
-              </a:rPr>
-              <a:t> </a:t>
-            </a:r>
-            <a:r>
-              <a:rPr lang="ru-RU" dirty="0" err="1">
-                <a:solidFill>
-                  <a:schemeClr val="bg1">
-                    <a:lumMod val="95000"/>
-                  </a:schemeClr>
-                </a:solidFill>
-              </a:rPr>
-              <a:t>приемете</a:t>
-            </a:r>
-            <a:r>
-              <a:rPr lang="ru-RU" dirty="0">
-                <a:solidFill>
-                  <a:schemeClr val="bg1">
-                    <a:lumMod val="95000"/>
-                  </a:schemeClr>
-                </a:solidFill>
-              </a:rPr>
-              <a:t> :</a:t>
+              <a:t>. </a:t>
             </a:r>
           </a:p>
           <a:p>
@@ -9065,15 +9005,7 @@
                   <a:schemeClr val="accent6"/>
                 </a:solidFill>
               </a:rPr>
-              <a:t> - н</a:t>
-            </a:r>
-            <a:r>
-              <a:rPr lang="bg-BG" dirty="0" smtClean="0">
-                <a:solidFill>
-                  <a:schemeClr val="accent6"/>
-                </a:solidFill>
-              </a:rPr>
-              <a:t>аследяване</a:t>
+              <a:t> - наследяване</a:t>
             </a:r>
             <a:endParaRPr lang="bg-BG" dirty="0">
               <a:solidFill>
@@ -10893,6 +10825,13 @@
   <p:clrMapOvr>
     <a:masterClrMapping/>
   </p:clrMapOvr>
+  <p:timing>
+    <p:tnLst>
+      <p:par>
+        <p:cTn id="1" dur="indefinite" restart="never" nodeType="tmRoot"/>
+      </p:par>
+    </p:tnLst>
+  </p:timing>
 </p:sld>
 </file>
 
@@ -14006,15 +13945,7 @@
                   <a:schemeClr val="accent6"/>
                 </a:solidFill>
               </a:rPr>
-              <a:t>Клас с к</a:t>
-            </a:r>
-            <a:r>
-              <a:rPr lang="bg-BG" dirty="0" smtClean="0">
-                <a:solidFill>
-                  <a:schemeClr val="accent6"/>
-                </a:solidFill>
-              </a:rPr>
-              <a:t>онструктор</a:t>
+              <a:t>Клас с конструктор</a:t>
             </a:r>
             <a:endParaRPr lang="bg-BG" dirty="0">
               <a:solidFill>
@@ -14663,15 +14594,7 @@
                   <a:schemeClr val="accent6"/>
                 </a:solidFill>
               </a:rPr>
-              <a:t>Освобождаване </a:t>
-            </a:r>
-            <a:r>
-              <a:rPr lang="bg-BG" dirty="0" smtClean="0">
-                <a:solidFill>
-                  <a:schemeClr val="accent6"/>
-                </a:solidFill>
-              </a:rPr>
-              <a:t>на обекти</a:t>
+              <a:t>Освобождаване на обекти</a:t>
             </a:r>
             <a:endParaRPr lang="bg-BG" dirty="0">
               <a:solidFill>

</xml_diff>

<commit_message>
Added Lecture 8 and samples + answers to some tasks from homework
</commit_message>
<xml_diff>
--- a/06-Classes-and-Objects.pptx
+++ b/06-Classes-and-Objects.pptx
@@ -133,6 +133,22 @@
       </a:defRPr>
     </a:lvl9pPr>
   </p:defaultTextStyle>
+  <p:extLst>
+    <p:ext uri="{EFAFB233-063F-42B5-8137-9DF3F51BA10A}">
+      <p15:sldGuideLst xmlns:p15="http://schemas.microsoft.com/office/powerpoint/2012/main">
+        <p15:guide id="1" orient="horz" pos="2160">
+          <p15:clr>
+            <a:srgbClr val="A4A3A4"/>
+          </p15:clr>
+        </p15:guide>
+        <p15:guide id="2" pos="2880">
+          <p15:clr>
+            <a:srgbClr val="A4A3A4"/>
+          </p15:clr>
+        </p15:guide>
+      </p15:sldGuideLst>
+    </p:ext>
+  </p:extLst>
 </p:presentation>
 </file>
 
@@ -218,7 +234,7 @@
           <a:p>
             <a:fld id="{1A052DDE-B79B-4585-97B6-DCDE6083B029}" type="datetimeFigureOut">
               <a:rPr lang="bg-BG" smtClean="0"/>
-              <a:t>13.5.2015 г.</a:t>
+              <a:t>18.5.2015 г.</a:t>
             </a:fld>
             <a:endParaRPr lang="bg-BG"/>
           </a:p>
@@ -667,7 +683,7 @@
           <a:p>
             <a:fld id="{3EA744D9-3FBE-48D8-BF2A-85DF203E4D20}" type="datetimeFigureOut">
               <a:rPr lang="bg-BG" smtClean="0"/>
-              <a:t>13.5.2015 г.</a:t>
+              <a:t>18.5.2015 г.</a:t>
             </a:fld>
             <a:endParaRPr lang="bg-BG"/>
           </a:p>
@@ -837,7 +853,7 @@
           <a:p>
             <a:fld id="{3EA744D9-3FBE-48D8-BF2A-85DF203E4D20}" type="datetimeFigureOut">
               <a:rPr lang="bg-BG" smtClean="0"/>
-              <a:t>13.5.2015 г.</a:t>
+              <a:t>18.5.2015 г.</a:t>
             </a:fld>
             <a:endParaRPr lang="bg-BG"/>
           </a:p>
@@ -1017,7 +1033,7 @@
           <a:p>
             <a:fld id="{3EA744D9-3FBE-48D8-BF2A-85DF203E4D20}" type="datetimeFigureOut">
               <a:rPr lang="bg-BG" smtClean="0"/>
-              <a:t>13.5.2015 г.</a:t>
+              <a:t>18.5.2015 г.</a:t>
             </a:fld>
             <a:endParaRPr lang="bg-BG"/>
           </a:p>
@@ -1187,7 +1203,7 @@
           <a:p>
             <a:fld id="{3EA744D9-3FBE-48D8-BF2A-85DF203E4D20}" type="datetimeFigureOut">
               <a:rPr lang="bg-BG" smtClean="0"/>
-              <a:t>13.5.2015 г.</a:t>
+              <a:t>18.5.2015 г.</a:t>
             </a:fld>
             <a:endParaRPr lang="bg-BG"/>
           </a:p>
@@ -1433,7 +1449,7 @@
           <a:p>
             <a:fld id="{3EA744D9-3FBE-48D8-BF2A-85DF203E4D20}" type="datetimeFigureOut">
               <a:rPr lang="bg-BG" smtClean="0"/>
-              <a:t>13.5.2015 г.</a:t>
+              <a:t>18.5.2015 г.</a:t>
             </a:fld>
             <a:endParaRPr lang="bg-BG"/>
           </a:p>
@@ -1721,7 +1737,7 @@
           <a:p>
             <a:fld id="{3EA744D9-3FBE-48D8-BF2A-85DF203E4D20}" type="datetimeFigureOut">
               <a:rPr lang="bg-BG" smtClean="0"/>
-              <a:t>13.5.2015 г.</a:t>
+              <a:t>18.5.2015 г.</a:t>
             </a:fld>
             <a:endParaRPr lang="bg-BG"/>
           </a:p>
@@ -2143,7 +2159,7 @@
           <a:p>
             <a:fld id="{3EA744D9-3FBE-48D8-BF2A-85DF203E4D20}" type="datetimeFigureOut">
               <a:rPr lang="bg-BG" smtClean="0"/>
-              <a:t>13.5.2015 г.</a:t>
+              <a:t>18.5.2015 г.</a:t>
             </a:fld>
             <a:endParaRPr lang="bg-BG"/>
           </a:p>
@@ -2261,7 +2277,7 @@
           <a:p>
             <a:fld id="{3EA744D9-3FBE-48D8-BF2A-85DF203E4D20}" type="datetimeFigureOut">
               <a:rPr lang="bg-BG" smtClean="0"/>
-              <a:t>13.5.2015 г.</a:t>
+              <a:t>18.5.2015 г.</a:t>
             </a:fld>
             <a:endParaRPr lang="bg-BG"/>
           </a:p>
@@ -2356,7 +2372,7 @@
           <a:p>
             <a:fld id="{3EA744D9-3FBE-48D8-BF2A-85DF203E4D20}" type="datetimeFigureOut">
               <a:rPr lang="bg-BG" smtClean="0"/>
-              <a:t>13.5.2015 г.</a:t>
+              <a:t>18.5.2015 г.</a:t>
             </a:fld>
             <a:endParaRPr lang="bg-BG"/>
           </a:p>
@@ -2633,7 +2649,7 @@
           <a:p>
             <a:fld id="{3EA744D9-3FBE-48D8-BF2A-85DF203E4D20}" type="datetimeFigureOut">
               <a:rPr lang="bg-BG" smtClean="0"/>
-              <a:t>13.5.2015 г.</a:t>
+              <a:t>18.5.2015 г.</a:t>
             </a:fld>
             <a:endParaRPr lang="bg-BG"/>
           </a:p>
@@ -2886,7 +2902,7 @@
           <a:p>
             <a:fld id="{3EA744D9-3FBE-48D8-BF2A-85DF203E4D20}" type="datetimeFigureOut">
               <a:rPr lang="bg-BG" smtClean="0"/>
-              <a:t>13.5.2015 г.</a:t>
+              <a:t>18.5.2015 г.</a:t>
             </a:fld>
             <a:endParaRPr lang="bg-BG"/>
           </a:p>
@@ -3108,7 +3124,7 @@
           <a:p>
             <a:fld id="{3EA744D9-3FBE-48D8-BF2A-85DF203E4D20}" type="datetimeFigureOut">
               <a:rPr lang="bg-BG" smtClean="0"/>
-              <a:t>13.5.2015 г.</a:t>
+              <a:t>18.5.2015 г.</a:t>
             </a:fld>
             <a:endParaRPr lang="bg-BG"/>
           </a:p>
@@ -4340,36 +4356,6 @@
               <a:buChar char="§"/>
             </a:pPr>
             <a:r>
-              <a:rPr lang="ru-RU" dirty="0">
-                <a:solidFill>
-                  <a:schemeClr val="bg1">
-                    <a:lumMod val="95000"/>
-                  </a:schemeClr>
-                </a:solidFill>
-              </a:rPr>
-              <a:t>В JAVA </a:t>
-            </a:r>
-            <a:r>
-              <a:rPr lang="ru-RU" dirty="0" err="1">
-                <a:solidFill>
-                  <a:schemeClr val="bg1">
-                    <a:lumMod val="95000"/>
-                  </a:schemeClr>
-                </a:solidFill>
-              </a:rPr>
-              <a:t>съществуват</a:t>
-            </a:r>
-            <a:r>
-              <a:rPr lang="ru-RU" dirty="0">
-                <a:solidFill>
-                  <a:schemeClr val="bg1">
-                    <a:lumMod val="95000"/>
-                  </a:schemeClr>
-                </a:solidFill>
-              </a:rPr>
-              <a:t> </a:t>
-            </a:r>
-            <a:r>
               <a:rPr lang="ru-RU" dirty="0" smtClean="0">
                 <a:solidFill>
                   <a:schemeClr val="bg1">
@@ -4377,37 +4363,7 @@
                   </a:schemeClr>
                 </a:solidFill>
               </a:rPr>
-              <a:t>4 </a:t>
-            </a:r>
-            <a:r>
-              <a:rPr lang="ru-RU" dirty="0">
-                <a:solidFill>
-                  <a:schemeClr val="bg1">
-                    <a:lumMod val="95000"/>
-                  </a:schemeClr>
-                </a:solidFill>
-              </a:rPr>
-              <a:t>нива на </a:t>
-            </a:r>
-            <a:r>
-              <a:rPr lang="ru-RU" dirty="0" err="1">
-                <a:solidFill>
-                  <a:schemeClr val="bg1">
-                    <a:lumMod val="95000"/>
-                  </a:schemeClr>
-                </a:solidFill>
-              </a:rPr>
-              <a:t>достъп</a:t>
-            </a:r>
-            <a:r>
-              <a:rPr lang="ru-RU" dirty="0">
-                <a:solidFill>
-                  <a:schemeClr val="bg1">
-                    <a:lumMod val="95000"/>
-                  </a:schemeClr>
-                </a:solidFill>
-              </a:rPr>
-              <a:t>:</a:t>
+              <a:t>В JAVA съществуват 4 нива на достъп:</a:t>
             </a:r>
           </a:p>
           <a:p>
@@ -4416,34 +4372,14 @@
               <a:buChar char="§"/>
             </a:pPr>
             <a:r>
-              <a:rPr lang="ru-RU" dirty="0" err="1">
-                <a:solidFill>
-                  <a:schemeClr val="bg1">
-                    <a:lumMod val="95000"/>
-                  </a:schemeClr>
-                </a:solidFill>
-              </a:rPr>
-              <a:t>public</a:t>
-            </a:r>
-            <a:r>
-              <a:rPr lang="ru-RU" dirty="0">
-                <a:solidFill>
-                  <a:schemeClr val="bg1">
-                    <a:lumMod val="95000"/>
-                  </a:schemeClr>
-                </a:solidFill>
-              </a:rPr>
-              <a:t> – видим за </a:t>
-            </a:r>
-            <a:r>
-              <a:rPr lang="ru-RU" dirty="0" err="1" smtClean="0">
-                <a:solidFill>
-                  <a:schemeClr val="bg1">
-                    <a:lumMod val="95000"/>
-                  </a:schemeClr>
-                </a:solidFill>
-              </a:rPr>
-              <a:t>всички</a:t>
+              <a:rPr lang="ru-RU" dirty="0" smtClean="0">
+                <a:solidFill>
+                  <a:schemeClr val="bg1">
+                    <a:lumMod val="95000"/>
+                  </a:schemeClr>
+                </a:solidFill>
+              </a:rPr>
+              <a:t>public – видим за всички</a:t>
             </a:r>
             <a:endParaRPr lang="en-US" dirty="0" smtClean="0">
               <a:solidFill>
@@ -4478,7 +4414,7 @@
               </a:rPr>
               <a:t> – въдим само в същия пакет</a:t>
             </a:r>
-            <a:endParaRPr lang="ru-RU" dirty="0">
+            <a:endParaRPr lang="ru-RU" dirty="0" smtClean="0">
               <a:solidFill>
                 <a:schemeClr val="bg1">
                   <a:lumMod val="95000"/>
@@ -4492,62 +4428,25 @@
               <a:buChar char="§"/>
             </a:pPr>
             <a:r>
-              <a:rPr lang="ru-RU" dirty="0" err="1">
-                <a:solidFill>
-                  <a:schemeClr val="bg1">
-                    <a:lumMod val="95000"/>
-                  </a:schemeClr>
-                </a:solidFill>
-              </a:rPr>
-              <a:t>protected</a:t>
-            </a:r>
-            <a:r>
-              <a:rPr lang="ru-RU" dirty="0">
-                <a:solidFill>
-                  <a:schemeClr val="bg1">
-                    <a:lumMod val="95000"/>
-                  </a:schemeClr>
-                </a:solidFill>
-              </a:rPr>
-              <a:t> – видим само за </a:t>
-            </a:r>
-            <a:r>
-              <a:rPr lang="ru-RU" dirty="0" err="1">
-                <a:solidFill>
-                  <a:schemeClr val="bg1">
-                    <a:lumMod val="95000"/>
-                  </a:schemeClr>
-                </a:solidFill>
-              </a:rPr>
-              <a:t>наследниците</a:t>
-            </a:r>
-            <a:r>
-              <a:rPr lang="ru-RU" dirty="0">
-                <a:solidFill>
-                  <a:schemeClr val="bg1">
-                    <a:lumMod val="95000"/>
-                  </a:schemeClr>
-                </a:solidFill>
-              </a:rPr>
-              <a:t> на </a:t>
-            </a:r>
-            <a:r>
-              <a:rPr lang="ru-RU" dirty="0" err="1">
-                <a:solidFill>
-                  <a:schemeClr val="bg1">
-                    <a:lumMod val="95000"/>
-                  </a:schemeClr>
-                </a:solidFill>
-              </a:rPr>
-              <a:t>класа</a:t>
-            </a:r>
-            <a:endParaRPr lang="ru-RU" dirty="0">
-              <a:solidFill>
-                <a:schemeClr val="bg1">
-                  <a:lumMod val="95000"/>
-                </a:schemeClr>
-              </a:solidFill>
-            </a:endParaRPr>
+              <a:rPr lang="ru-RU" dirty="0" smtClean="0">
+                <a:solidFill>
+                  <a:schemeClr val="bg1">
+                    <a:lumMod val="95000"/>
+                  </a:schemeClr>
+                </a:solidFill>
+              </a:rPr>
+              <a:t>protected </a:t>
+            </a:r>
+            <a:r>
+              <a:rPr lang="ru-RU" dirty="0">
+                <a:solidFill>
+                  <a:schemeClr val="bg1">
+                    <a:lumMod val="95000"/>
+                  </a:schemeClr>
+                </a:solidFill>
+              </a:rPr>
+              <a:t>– видим само за наследниците на класа</a:t>
+            </a:r>
           </a:p>
           <a:p>
             <a:pPr lvl="1">

</xml_diff>